<commit_message>
added the end slide
</commit_message>
<xml_diff>
--- a/Anvisys-Profile.pptx
+++ b/Anvisys-Profile.pptx
@@ -123,7 +123,7 @@
   </p:defaultTextStyle>
   <p:extLst>
     <p:ext uri="{EFAFB233-063F-42B5-8137-9DF3F51BA10A}">
-      <p15:sldGuideLst xmlns:p15="http://schemas.microsoft.com/office/powerpoint/2012/main">
+      <p15:sldGuideLst xmlns:p15="http://schemas.microsoft.com/office/powerpoint/2012/main" xmlns="">
         <p15:guide id="1" orient="horz" pos="2160">
           <p15:clr>
             <a:srgbClr val="A4A3A4"/>
@@ -8187,7 +8187,7 @@
             <p:cNvPr id="46" name="Picture 45">
               <a:extLst>
                 <a:ext uri="{FF2B5EF4-FFF2-40B4-BE49-F238E27FC236}">
-                  <a16:creationId xmlns:a16="http://schemas.microsoft.com/office/drawing/2014/main" id="{13C97FC4-4358-46A7-89E4-BB08F494C22B}"/>
+                  <a16:creationId xmlns:a16="http://schemas.microsoft.com/office/drawing/2014/main" xmlns="" id="{13C97FC4-4358-46A7-89E4-BB08F494C22B}"/>
                 </a:ext>
               </a:extLst>
             </p:cNvPr>
@@ -14680,6 +14680,36 @@
           <a:chExt cx="0" cy="0"/>
         </a:xfrm>
       </p:grpSpPr>
+      <p:sp>
+        <p:nvSpPr>
+          <p:cNvPr id="2" name="TextBox 1"/>
+          <p:cNvSpPr txBox="1"/>
+          <p:nvPr/>
+        </p:nvSpPr>
+        <p:spPr>
+          <a:xfrm>
+            <a:off x="3131840" y="1988840"/>
+            <a:ext cx="1445780" cy="369332"/>
+          </a:xfrm>
+          <a:prstGeom prst="rect">
+            <a:avLst/>
+          </a:prstGeom>
+          <a:noFill/>
+        </p:spPr>
+        <p:txBody>
+          <a:bodyPr wrap="none" rtlCol="0">
+            <a:spAutoFit/>
+          </a:bodyPr>
+          <a:lstStyle/>
+          <a:p>
+            <a:r>
+              <a:rPr lang="en-IN" dirty="0" smtClean="0"/>
+              <a:t>Any Question</a:t>
+            </a:r>
+            <a:endParaRPr lang="en-IN" dirty="0"/>
+          </a:p>
+        </p:txBody>
+      </p:sp>
     </p:spTree>
     <p:extLst>
       <p:ext uri="{BB962C8B-B14F-4D97-AF65-F5344CB8AC3E}">
@@ -17635,7 +17665,7 @@
           <p:cNvPr id="2" name="Title 1">
             <a:extLst>
               <a:ext uri="{FF2B5EF4-FFF2-40B4-BE49-F238E27FC236}">
-                <a16:creationId xmlns:a16="http://schemas.microsoft.com/office/drawing/2014/main" id="{865131AC-C32E-4601-89C1-F9ECEAF1EE04}"/>
+                <a16:creationId xmlns:a16="http://schemas.microsoft.com/office/drawing/2014/main" xmlns="" id="{865131AC-C32E-4601-89C1-F9ECEAF1EE04}"/>
               </a:ext>
             </a:extLst>
           </p:cNvPr>
@@ -17663,7 +17693,7 @@
           <p:cNvPr id="4" name="Content Placeholder 3">
             <a:extLst>
               <a:ext uri="{FF2B5EF4-FFF2-40B4-BE49-F238E27FC236}">
-                <a16:creationId xmlns:a16="http://schemas.microsoft.com/office/drawing/2014/main" id="{A72069BE-05CC-45C4-AAAF-DD81FB7FC5EC}"/>
+                <a16:creationId xmlns:a16="http://schemas.microsoft.com/office/drawing/2014/main" xmlns="" id="{A72069BE-05CC-45C4-AAAF-DD81FB7FC5EC}"/>
               </a:ext>
             </a:extLst>
           </p:cNvPr>
@@ -17695,7 +17725,7 @@
           <p:cNvPr id="6" name="Content Placeholder 4">
             <a:extLst>
               <a:ext uri="{FF2B5EF4-FFF2-40B4-BE49-F238E27FC236}">
-                <a16:creationId xmlns:a16="http://schemas.microsoft.com/office/drawing/2014/main" id="{7BF9F0F9-5BC9-4CB9-99D8-5D9E77EBA532}"/>
+                <a16:creationId xmlns:a16="http://schemas.microsoft.com/office/drawing/2014/main" xmlns="" id="{7BF9F0F9-5BC9-4CB9-99D8-5D9E77EBA532}"/>
               </a:ext>
             </a:extLst>
           </p:cNvPr>
@@ -17985,7 +18015,7 @@
           <p:cNvPr id="2" name="Title 1">
             <a:extLst>
               <a:ext uri="{FF2B5EF4-FFF2-40B4-BE49-F238E27FC236}">
-                <a16:creationId xmlns:a16="http://schemas.microsoft.com/office/drawing/2014/main" id="{FDB1AA29-50E7-47E6-B428-02DFC33376E2}"/>
+                <a16:creationId xmlns:a16="http://schemas.microsoft.com/office/drawing/2014/main" xmlns="" id="{FDB1AA29-50E7-47E6-B428-02DFC33376E2}"/>
               </a:ext>
             </a:extLst>
           </p:cNvPr>
@@ -18013,7 +18043,7 @@
           <p:cNvPr id="5" name="Content Placeholder 4">
             <a:extLst>
               <a:ext uri="{FF2B5EF4-FFF2-40B4-BE49-F238E27FC236}">
-                <a16:creationId xmlns:a16="http://schemas.microsoft.com/office/drawing/2014/main" id="{847CD382-9F7F-4E8D-9A4A-354D788A0575}"/>
+                <a16:creationId xmlns:a16="http://schemas.microsoft.com/office/drawing/2014/main" xmlns="" id="{847CD382-9F7F-4E8D-9A4A-354D788A0575}"/>
               </a:ext>
             </a:extLst>
           </p:cNvPr>
@@ -18048,7 +18078,7 @@
           <p:cNvPr id="6" name="Rectangle 5">
             <a:extLst>
               <a:ext uri="{FF2B5EF4-FFF2-40B4-BE49-F238E27FC236}">
-                <a16:creationId xmlns:a16="http://schemas.microsoft.com/office/drawing/2014/main" id="{098B67DA-9FA7-4BEF-A34E-941BB7FC651C}"/>
+                <a16:creationId xmlns:a16="http://schemas.microsoft.com/office/drawing/2014/main" xmlns="" id="{098B67DA-9FA7-4BEF-A34E-941BB7FC651C}"/>
               </a:ext>
             </a:extLst>
           </p:cNvPr>
@@ -18160,7 +18190,7 @@
           <p:cNvPr id="2" name="Title 1">
             <a:extLst>
               <a:ext uri="{FF2B5EF4-FFF2-40B4-BE49-F238E27FC236}">
-                <a16:creationId xmlns:a16="http://schemas.microsoft.com/office/drawing/2014/main" id="{50593DC5-4360-41D5-8B5E-737BD66331DD}"/>
+                <a16:creationId xmlns:a16="http://schemas.microsoft.com/office/drawing/2014/main" xmlns="" id="{50593DC5-4360-41D5-8B5E-737BD66331DD}"/>
               </a:ext>
             </a:extLst>
           </p:cNvPr>
@@ -18188,7 +18218,7 @@
           <p:cNvPr id="3" name="Content Placeholder 2">
             <a:extLst>
               <a:ext uri="{FF2B5EF4-FFF2-40B4-BE49-F238E27FC236}">
-                <a16:creationId xmlns:a16="http://schemas.microsoft.com/office/drawing/2014/main" id="{C5AE02B3-EF90-4416-AEEE-224A06B0B82F}"/>
+                <a16:creationId xmlns:a16="http://schemas.microsoft.com/office/drawing/2014/main" xmlns="" id="{C5AE02B3-EF90-4416-AEEE-224A06B0B82F}"/>
               </a:ext>
             </a:extLst>
           </p:cNvPr>
@@ -18258,7 +18288,7 @@
           <p:cNvPr id="4" name="Picture 3">
             <a:extLst>
               <a:ext uri="{FF2B5EF4-FFF2-40B4-BE49-F238E27FC236}">
-                <a16:creationId xmlns:a16="http://schemas.microsoft.com/office/drawing/2014/main" id="{A42434AC-FE93-41AA-8252-B01263232350}"/>
+                <a16:creationId xmlns:a16="http://schemas.microsoft.com/office/drawing/2014/main" xmlns="" id="{A42434AC-FE93-41AA-8252-B01263232350}"/>
               </a:ext>
             </a:extLst>
           </p:cNvPr>
@@ -18318,7 +18348,7 @@
           <p:cNvPr id="2" name="Title 1">
             <a:extLst>
               <a:ext uri="{FF2B5EF4-FFF2-40B4-BE49-F238E27FC236}">
-                <a16:creationId xmlns:a16="http://schemas.microsoft.com/office/drawing/2014/main" id="{C92193BD-EEB5-4CC3-BE21-D39BD95A385D}"/>
+                <a16:creationId xmlns:a16="http://schemas.microsoft.com/office/drawing/2014/main" xmlns="" id="{C92193BD-EEB5-4CC3-BE21-D39BD95A385D}"/>
               </a:ext>
             </a:extLst>
           </p:cNvPr>
@@ -18346,7 +18376,7 @@
           <p:cNvPr id="3" name="Content Placeholder 2">
             <a:extLst>
               <a:ext uri="{FF2B5EF4-FFF2-40B4-BE49-F238E27FC236}">
-                <a16:creationId xmlns:a16="http://schemas.microsoft.com/office/drawing/2014/main" id="{A4590DDC-E5B1-460D-8B70-03C4082BCC79}"/>
+                <a16:creationId xmlns:a16="http://schemas.microsoft.com/office/drawing/2014/main" xmlns="" id="{A4590DDC-E5B1-460D-8B70-03C4082BCC79}"/>
               </a:ext>
             </a:extLst>
           </p:cNvPr>

</xml_diff>